<commit_message>
Tela de load Java
</commit_message>
<xml_diff>
--- a/Prototipação do Java/tela de login.pptx
+++ b/Prototipação do Java/tela de login.pptx
@@ -5,7 +5,8 @@
     <p:sldMasterId id="2147483648" r:id="rId1"/>
   </p:sldMasterIdLst>
   <p:sldIdLst>
-    <p:sldId id="256" r:id="rId2"/>
+    <p:sldId id="257" r:id="rId2"/>
+    <p:sldId id="256" r:id="rId3"/>
   </p:sldIdLst>
   <p:sldSz cx="12192000" cy="6858000"/>
   <p:notesSz cx="6858000" cy="9144000"/>
@@ -104,6 +105,11 @@
       </a:defRPr>
     </a:lvl9pPr>
   </p:defaultTextStyle>
+  <p:extLst>
+    <p:ext uri="{EFAFB233-063F-42B5-8137-9DF3F51BA10A}">
+      <p15:sldGuideLst xmlns:p15="http://schemas.microsoft.com/office/powerpoint/2012/main"/>
+    </p:ext>
+  </p:extLst>
 </p:presentation>
 </file>
 
@@ -254,7 +260,7 @@
           <a:p>
             <a:fld id="{DA16158A-EE52-4050-A386-60AFDDA2A8AF}" type="datetimeFigureOut">
               <a:rPr lang="pt-BR" smtClean="0"/>
-              <a:t>19/10/2020</a:t>
+              <a:t>21/10/2020</a:t>
             </a:fld>
             <a:endParaRPr lang="pt-BR"/>
           </a:p>
@@ -452,7 +458,7 @@
           <a:p>
             <a:fld id="{DA16158A-EE52-4050-A386-60AFDDA2A8AF}" type="datetimeFigureOut">
               <a:rPr lang="pt-BR" smtClean="0"/>
-              <a:t>19/10/2020</a:t>
+              <a:t>21/10/2020</a:t>
             </a:fld>
             <a:endParaRPr lang="pt-BR"/>
           </a:p>
@@ -660,7 +666,7 @@
           <a:p>
             <a:fld id="{DA16158A-EE52-4050-A386-60AFDDA2A8AF}" type="datetimeFigureOut">
               <a:rPr lang="pt-BR" smtClean="0"/>
-              <a:t>19/10/2020</a:t>
+              <a:t>21/10/2020</a:t>
             </a:fld>
             <a:endParaRPr lang="pt-BR"/>
           </a:p>
@@ -858,7 +864,7 @@
           <a:p>
             <a:fld id="{DA16158A-EE52-4050-A386-60AFDDA2A8AF}" type="datetimeFigureOut">
               <a:rPr lang="pt-BR" smtClean="0"/>
-              <a:t>19/10/2020</a:t>
+              <a:t>21/10/2020</a:t>
             </a:fld>
             <a:endParaRPr lang="pt-BR"/>
           </a:p>
@@ -1133,7 +1139,7 @@
           <a:p>
             <a:fld id="{DA16158A-EE52-4050-A386-60AFDDA2A8AF}" type="datetimeFigureOut">
               <a:rPr lang="pt-BR" smtClean="0"/>
-              <a:t>19/10/2020</a:t>
+              <a:t>21/10/2020</a:t>
             </a:fld>
             <a:endParaRPr lang="pt-BR"/>
           </a:p>
@@ -1398,7 +1404,7 @@
           <a:p>
             <a:fld id="{DA16158A-EE52-4050-A386-60AFDDA2A8AF}" type="datetimeFigureOut">
               <a:rPr lang="pt-BR" smtClean="0"/>
-              <a:t>19/10/2020</a:t>
+              <a:t>21/10/2020</a:t>
             </a:fld>
             <a:endParaRPr lang="pt-BR"/>
           </a:p>
@@ -1810,7 +1816,7 @@
           <a:p>
             <a:fld id="{DA16158A-EE52-4050-A386-60AFDDA2A8AF}" type="datetimeFigureOut">
               <a:rPr lang="pt-BR" smtClean="0"/>
-              <a:t>19/10/2020</a:t>
+              <a:t>21/10/2020</a:t>
             </a:fld>
             <a:endParaRPr lang="pt-BR"/>
           </a:p>
@@ -1951,7 +1957,7 @@
           <a:p>
             <a:fld id="{DA16158A-EE52-4050-A386-60AFDDA2A8AF}" type="datetimeFigureOut">
               <a:rPr lang="pt-BR" smtClean="0"/>
-              <a:t>19/10/2020</a:t>
+              <a:t>21/10/2020</a:t>
             </a:fld>
             <a:endParaRPr lang="pt-BR"/>
           </a:p>
@@ -2064,7 +2070,7 @@
           <a:p>
             <a:fld id="{DA16158A-EE52-4050-A386-60AFDDA2A8AF}" type="datetimeFigureOut">
               <a:rPr lang="pt-BR" smtClean="0"/>
-              <a:t>19/10/2020</a:t>
+              <a:t>21/10/2020</a:t>
             </a:fld>
             <a:endParaRPr lang="pt-BR"/>
           </a:p>
@@ -2375,7 +2381,7 @@
           <a:p>
             <a:fld id="{DA16158A-EE52-4050-A386-60AFDDA2A8AF}" type="datetimeFigureOut">
               <a:rPr lang="pt-BR" smtClean="0"/>
-              <a:t>19/10/2020</a:t>
+              <a:t>21/10/2020</a:t>
             </a:fld>
             <a:endParaRPr lang="pt-BR"/>
           </a:p>
@@ -2663,7 +2669,7 @@
           <a:p>
             <a:fld id="{DA16158A-EE52-4050-A386-60AFDDA2A8AF}" type="datetimeFigureOut">
               <a:rPr lang="pt-BR" smtClean="0"/>
-              <a:t>19/10/2020</a:t>
+              <a:t>21/10/2020</a:t>
             </a:fld>
             <a:endParaRPr lang="pt-BR"/>
           </a:p>
@@ -2904,7 +2910,7 @@
           <a:p>
             <a:fld id="{DA16158A-EE52-4050-A386-60AFDDA2A8AF}" type="datetimeFigureOut">
               <a:rPr lang="pt-BR" smtClean="0"/>
-              <a:t>19/10/2020</a:t>
+              <a:t>21/10/2020</a:t>
             </a:fld>
             <a:endParaRPr lang="pt-BR"/>
           </a:p>
@@ -3323,6 +3329,378 @@
       </p:grpSpPr>
       <p:sp>
         <p:nvSpPr>
+          <p:cNvPr id="2" name="Retângulo 1">
+            <a:extLst>
+              <a:ext uri="{FF2B5EF4-FFF2-40B4-BE49-F238E27FC236}">
+                <a16:creationId xmlns:a16="http://schemas.microsoft.com/office/drawing/2014/main" id="{B8DBC94A-26AB-4BB2-A41A-266684561861}"/>
+              </a:ext>
+            </a:extLst>
+          </p:cNvPr>
+          <p:cNvSpPr/>
+          <p:nvPr/>
+        </p:nvSpPr>
+        <p:spPr>
+          <a:xfrm>
+            <a:off x="0" y="0"/>
+            <a:ext cx="12192000" cy="6858000"/>
+          </a:xfrm>
+          <a:prstGeom prst="rect">
+            <a:avLst/>
+          </a:prstGeom>
+        </p:spPr>
+        <p:style>
+          <a:lnRef idx="2">
+            <a:schemeClr val="dk1">
+              <a:shade val="50000"/>
+            </a:schemeClr>
+          </a:lnRef>
+          <a:fillRef idx="1">
+            <a:schemeClr val="dk1"/>
+          </a:fillRef>
+          <a:effectRef idx="0">
+            <a:schemeClr val="dk1"/>
+          </a:effectRef>
+          <a:fontRef idx="minor">
+            <a:schemeClr val="lt1"/>
+          </a:fontRef>
+        </p:style>
+        <p:txBody>
+          <a:bodyPr rtlCol="0" anchor="ctr"/>
+          <a:lstStyle/>
+          <a:p>
+            <a:pPr algn="ctr"/>
+            <a:endParaRPr lang="pt-BR" dirty="0"/>
+          </a:p>
+        </p:txBody>
+      </p:sp>
+      <p:pic>
+        <p:nvPicPr>
+          <p:cNvPr id="4" name="Imagem 3" descr="Logotipo&#10;&#10;Descrição gerada automaticamente">
+            <a:extLst>
+              <a:ext uri="{FF2B5EF4-FFF2-40B4-BE49-F238E27FC236}">
+                <a16:creationId xmlns:a16="http://schemas.microsoft.com/office/drawing/2014/main" id="{48D1774D-8069-45F6-859D-E743C04FC312}"/>
+              </a:ext>
+            </a:extLst>
+          </p:cNvPr>
+          <p:cNvPicPr>
+            <a:picLocks noChangeAspect="1"/>
+          </p:cNvPicPr>
+          <p:nvPr/>
+        </p:nvPicPr>
+        <p:blipFill>
+          <a:blip r:embed="rId2">
+            <a:extLst>
+              <a:ext uri="{28A0092B-C50C-407E-A947-70E740481C1C}">
+                <a14:useLocalDpi xmlns:a14="http://schemas.microsoft.com/office/drawing/2010/main" val="0"/>
+              </a:ext>
+            </a:extLst>
+          </a:blip>
+          <a:stretch>
+            <a:fillRect/>
+          </a:stretch>
+        </p:blipFill>
+        <p:spPr>
+          <a:xfrm>
+            <a:off x="3118492" y="1591768"/>
+            <a:ext cx="5858977" cy="3005646"/>
+          </a:xfrm>
+          <a:prstGeom prst="rect">
+            <a:avLst/>
+          </a:prstGeom>
+        </p:spPr>
+      </p:pic>
+      <p:sp>
+        <p:nvSpPr>
+          <p:cNvPr id="5" name="CaixaDeTexto 4">
+            <a:extLst>
+              <a:ext uri="{FF2B5EF4-FFF2-40B4-BE49-F238E27FC236}">
+                <a16:creationId xmlns:a16="http://schemas.microsoft.com/office/drawing/2014/main" id="{1C094519-F472-4BB9-96F5-0F28A3C668A4}"/>
+              </a:ext>
+            </a:extLst>
+          </p:cNvPr>
+          <p:cNvSpPr txBox="1"/>
+          <p:nvPr/>
+        </p:nvSpPr>
+        <p:spPr>
+          <a:xfrm>
+            <a:off x="3371586" y="4866122"/>
+            <a:ext cx="5352791" cy="400110"/>
+          </a:xfrm>
+          <a:prstGeom prst="rect">
+            <a:avLst/>
+          </a:prstGeom>
+          <a:noFill/>
+        </p:spPr>
+        <p:txBody>
+          <a:bodyPr wrap="square" rtlCol="0">
+            <a:spAutoFit/>
+          </a:bodyPr>
+          <a:lstStyle/>
+          <a:p>
+            <a:pPr algn="ctr"/>
+            <a:r>
+              <a:rPr lang="pt-BR" sz="2000" b="1" dirty="0">
+                <a:solidFill>
+                  <a:schemeClr val="bg1"/>
+                </a:solidFill>
+                <a:latin typeface="DejaVu Serif" panose="02060603050605020204" pitchFamily="18" charset="0"/>
+                <a:ea typeface="DejaVu Serif" panose="02060603050605020204" pitchFamily="18" charset="0"/>
+              </a:rPr>
+              <a:t>MIND6 DIGITAL SOLUTIONS</a:t>
+            </a:r>
+          </a:p>
+        </p:txBody>
+      </p:sp>
+      <p:sp>
+        <p:nvSpPr>
+          <p:cNvPr id="6" name="Retângulo 5">
+            <a:extLst>
+              <a:ext uri="{FF2B5EF4-FFF2-40B4-BE49-F238E27FC236}">
+                <a16:creationId xmlns:a16="http://schemas.microsoft.com/office/drawing/2014/main" id="{E70E6880-2DA4-4C51-BF0C-158768E85297}"/>
+              </a:ext>
+            </a:extLst>
+          </p:cNvPr>
+          <p:cNvSpPr/>
+          <p:nvPr/>
+        </p:nvSpPr>
+        <p:spPr>
+          <a:xfrm>
+            <a:off x="2845495" y="4728336"/>
+            <a:ext cx="6501009" cy="45719"/>
+          </a:xfrm>
+          <a:prstGeom prst="rect">
+            <a:avLst/>
+          </a:prstGeom>
+          <a:ln>
+            <a:solidFill>
+              <a:schemeClr val="bg1"/>
+            </a:solidFill>
+          </a:ln>
+        </p:spPr>
+        <p:style>
+          <a:lnRef idx="2">
+            <a:schemeClr val="accent6"/>
+          </a:lnRef>
+          <a:fillRef idx="1">
+            <a:schemeClr val="lt1"/>
+          </a:fillRef>
+          <a:effectRef idx="0">
+            <a:schemeClr val="accent6"/>
+          </a:effectRef>
+          <a:fontRef idx="minor">
+            <a:schemeClr val="dk1"/>
+          </a:fontRef>
+        </p:style>
+        <p:txBody>
+          <a:bodyPr rtlCol="0" anchor="ctr"/>
+          <a:lstStyle/>
+          <a:p>
+            <a:pPr algn="ctr"/>
+            <a:endParaRPr lang="pt-BR"/>
+          </a:p>
+        </p:txBody>
+      </p:sp>
+    </p:spTree>
+    <p:extLst>
+      <p:ext uri="{BB962C8B-B14F-4D97-AF65-F5344CB8AC3E}">
+        <p14:creationId xmlns:p14="http://schemas.microsoft.com/office/powerpoint/2010/main" val="3858970489"/>
+      </p:ext>
+    </p:extLst>
+  </p:cSld>
+  <p:clrMapOvr>
+    <a:masterClrMapping/>
+  </p:clrMapOvr>
+  <mc:AlternateContent xmlns:mc="http://schemas.openxmlformats.org/markup-compatibility/2006">
+    <mc:Choice xmlns:p14="http://schemas.microsoft.com/office/powerpoint/2010/main" Requires="p14">
+      <p:transition spd="med" p14:dur="700">
+        <p:fade/>
+      </p:transition>
+    </mc:Choice>
+    <mc:Fallback>
+      <p:transition spd="med">
+        <p:fade/>
+      </p:transition>
+    </mc:Fallback>
+  </mc:AlternateContent>
+  <p:timing>
+    <p:tnLst>
+      <p:par>
+        <p:cTn id="1" dur="indefinite" restart="never" nodeType="tmRoot">
+          <p:childTnLst>
+            <p:seq concurrent="1" nextAc="seek">
+              <p:cTn id="2" dur="indefinite" nodeType="mainSeq">
+                <p:childTnLst>
+                  <p:par>
+                    <p:cTn id="3" fill="hold">
+                      <p:stCondLst>
+                        <p:cond delay="indefinite"/>
+                      </p:stCondLst>
+                      <p:childTnLst>
+                        <p:par>
+                          <p:cTn id="4" fill="hold">
+                            <p:stCondLst>
+                              <p:cond delay="0"/>
+                            </p:stCondLst>
+                            <p:childTnLst>
+                              <p:par>
+                                <p:cTn id="5" presetID="10" presetClass="entr" presetSubtype="0" fill="hold" nodeType="clickEffect">
+                                  <p:stCondLst>
+                                    <p:cond delay="0"/>
+                                  </p:stCondLst>
+                                  <p:childTnLst>
+                                    <p:set>
+                                      <p:cBhvr>
+                                        <p:cTn id="6" dur="1" fill="hold">
+                                          <p:stCondLst>
+                                            <p:cond delay="0"/>
+                                          </p:stCondLst>
+                                        </p:cTn>
+                                        <p:tgtEl>
+                                          <p:spTgt spid="4"/>
+                                        </p:tgtEl>
+                                        <p:attrNameLst>
+                                          <p:attrName>style.visibility</p:attrName>
+                                        </p:attrNameLst>
+                                      </p:cBhvr>
+                                      <p:to>
+                                        <p:strVal val="visible"/>
+                                      </p:to>
+                                    </p:set>
+                                    <p:animEffect transition="in" filter="fade">
+                                      <p:cBhvr>
+                                        <p:cTn id="7" dur="500"/>
+                                        <p:tgtEl>
+                                          <p:spTgt spid="4"/>
+                                        </p:tgtEl>
+                                      </p:cBhvr>
+                                    </p:animEffect>
+                                  </p:childTnLst>
+                                </p:cTn>
+                              </p:par>
+                              <p:par>
+                                <p:cTn id="8" presetID="10" presetClass="entr" presetSubtype="0" fill="hold" grpId="0" nodeType="withEffect">
+                                  <p:stCondLst>
+                                    <p:cond delay="500"/>
+                                  </p:stCondLst>
+                                  <p:childTnLst>
+                                    <p:set>
+                                      <p:cBhvr>
+                                        <p:cTn id="9" dur="1" fill="hold">
+                                          <p:stCondLst>
+                                            <p:cond delay="0"/>
+                                          </p:stCondLst>
+                                        </p:cTn>
+                                        <p:tgtEl>
+                                          <p:spTgt spid="6"/>
+                                        </p:tgtEl>
+                                        <p:attrNameLst>
+                                          <p:attrName>style.visibility</p:attrName>
+                                        </p:attrNameLst>
+                                      </p:cBhvr>
+                                      <p:to>
+                                        <p:strVal val="visible"/>
+                                      </p:to>
+                                    </p:set>
+                                    <p:animEffect transition="in" filter="fade">
+                                      <p:cBhvr>
+                                        <p:cTn id="10" dur="500"/>
+                                        <p:tgtEl>
+                                          <p:spTgt spid="6"/>
+                                        </p:tgtEl>
+                                      </p:cBhvr>
+                                    </p:animEffect>
+                                  </p:childTnLst>
+                                </p:cTn>
+                              </p:par>
+                              <p:par>
+                                <p:cTn id="11" presetID="10" presetClass="entr" presetSubtype="0" fill="hold" grpId="0" nodeType="withEffect">
+                                  <p:stCondLst>
+                                    <p:cond delay="1000"/>
+                                  </p:stCondLst>
+                                  <p:childTnLst>
+                                    <p:set>
+                                      <p:cBhvr>
+                                        <p:cTn id="12" dur="1" fill="hold">
+                                          <p:stCondLst>
+                                            <p:cond delay="0"/>
+                                          </p:stCondLst>
+                                        </p:cTn>
+                                        <p:tgtEl>
+                                          <p:spTgt spid="5"/>
+                                        </p:tgtEl>
+                                        <p:attrNameLst>
+                                          <p:attrName>style.visibility</p:attrName>
+                                        </p:attrNameLst>
+                                      </p:cBhvr>
+                                      <p:to>
+                                        <p:strVal val="visible"/>
+                                      </p:to>
+                                    </p:set>
+                                    <p:animEffect transition="in" filter="fade">
+                                      <p:cBhvr>
+                                        <p:cTn id="13" dur="500"/>
+                                        <p:tgtEl>
+                                          <p:spTgt spid="5"/>
+                                        </p:tgtEl>
+                                      </p:cBhvr>
+                                    </p:animEffect>
+                                  </p:childTnLst>
+                                </p:cTn>
+                              </p:par>
+                            </p:childTnLst>
+                          </p:cTn>
+                        </p:par>
+                      </p:childTnLst>
+                    </p:cTn>
+                  </p:par>
+                </p:childTnLst>
+              </p:cTn>
+              <p:prevCondLst>
+                <p:cond evt="onPrev" delay="0">
+                  <p:tgtEl>
+                    <p:sldTgt/>
+                  </p:tgtEl>
+                </p:cond>
+              </p:prevCondLst>
+              <p:nextCondLst>
+                <p:cond evt="onNext" delay="0">
+                  <p:tgtEl>
+                    <p:sldTgt/>
+                  </p:tgtEl>
+                </p:cond>
+              </p:nextCondLst>
+            </p:seq>
+          </p:childTnLst>
+        </p:cTn>
+      </p:par>
+    </p:tnLst>
+    <p:bldLst>
+      <p:bldP spid="5" grpId="0"/>
+      <p:bldP spid="6" grpId="0" animBg="1"/>
+    </p:bldLst>
+  </p:timing>
+</p:sld>
+</file>
+
+<file path=ppt/slides/slide2.xml><?xml version="1.0" encoding="utf-8"?>
+<p:sld xmlns:a="http://schemas.openxmlformats.org/drawingml/2006/main" xmlns:r="http://schemas.openxmlformats.org/officeDocument/2006/relationships" xmlns:p="http://schemas.openxmlformats.org/presentationml/2006/main">
+  <p:cSld>
+    <p:spTree>
+      <p:nvGrpSpPr>
+        <p:cNvPr id="1" name=""/>
+        <p:cNvGrpSpPr/>
+        <p:nvPr/>
+      </p:nvGrpSpPr>
+      <p:grpSpPr>
+        <a:xfrm>
+          <a:off x="0" y="0"/>
+          <a:ext cx="0" cy="0"/>
+          <a:chOff x="0" y="0"/>
+          <a:chExt cx="0" cy="0"/>
+        </a:xfrm>
+      </p:grpSpPr>
+      <p:sp>
+        <p:nvSpPr>
           <p:cNvPr id="4" name="Retângulo 3">
             <a:extLst>
               <a:ext uri="{FF2B5EF4-FFF2-40B4-BE49-F238E27FC236}">

</xml_diff>

<commit_message>
Prototipação tela de Dashboard e organização de pastas
</commit_message>
<xml_diff>
--- a/Prototipação do Java/tela de login.pptx
+++ b/Prototipação do Java/tela de login.pptx
@@ -3510,13 +3510,13 @@
   <p:clrMapOvr>
     <a:masterClrMapping/>
   </p:clrMapOvr>
-  <mc:AlternateContent xmlns:mc="http://schemas.openxmlformats.org/markup-compatibility/2006">
-    <mc:Choice xmlns:p14="http://schemas.microsoft.com/office/powerpoint/2010/main" Requires="p14">
+  <mc:AlternateContent xmlns:mc="http://schemas.openxmlformats.org/markup-compatibility/2006" xmlns:p14="http://schemas.microsoft.com/office/powerpoint/2010/main">
+    <mc:Choice Requires="p14">
       <p:transition spd="med" p14:dur="700">
         <p:fade/>
       </p:transition>
     </mc:Choice>
-    <mc:Fallback>
+    <mc:Fallback xmlns="">
       <p:transition spd="med">
         <p:fade/>
       </p:transition>
@@ -3725,7 +3725,9 @@
             </a:schemeClr>
           </a:solidFill>
           <a:ln>
-            <a:noFill/>
+            <a:solidFill>
+              <a:schemeClr val="accent1"/>
+            </a:solidFill>
           </a:ln>
         </p:spPr>
         <p:style>

</xml_diff>